<commit_message>
Update to lab 200
</commit_message>
<xml_diff>
--- a/workshops/microservices-MySQL/WorkshopHeader.pptx
+++ b/workshops/microservices-MySQL/WorkshopHeader.pptx
@@ -104,6 +104,11 @@
       </a:defRPr>
     </a:lvl9pPr>
   </p:defaultTextStyle>
+  <p:extLst>
+    <p:ext uri="{EFAFB233-063F-42B5-8137-9DF3F51BA10A}">
+      <p15:sldGuideLst xmlns:p15="http://schemas.microsoft.com/office/powerpoint/2012/main"/>
+    </p:ext>
+  </p:extLst>
 </p:presentation>
 </file>
 
@@ -149,10 +154,9 @@
           </a:lstStyle>
           <a:p>
             <a:r>
-              <a:rPr lang="en-US" smtClean="0"/>
+              <a:rPr lang="en-US"/>
               <a:t>Click to edit Master title style</a:t>
             </a:r>
-            <a:endParaRPr lang="en-US"/>
           </a:p>
         </p:txBody>
       </p:sp>
@@ -214,10 +218,9 @@
           </a:lstStyle>
           <a:p>
             <a:r>
-              <a:rPr lang="en-US" smtClean="0"/>
+              <a:rPr lang="en-US"/>
               <a:t>Click to edit Master subtitle style</a:t>
             </a:r>
-            <a:endParaRPr lang="en-US"/>
           </a:p>
         </p:txBody>
       </p:sp>
@@ -238,7 +241,7 @@
           <a:p>
             <a:fld id="{BED1614E-28FD-C54C-811F-CB4EE2076F62}" type="datetimeFigureOut">
               <a:rPr lang="en-US" smtClean="0"/>
-              <a:t>1/27/17</a:t>
+              <a:t>9/5/2017</a:t>
             </a:fld>
             <a:endParaRPr lang="en-US"/>
           </a:p>
@@ -332,10 +335,9 @@
           <a:lstStyle/>
           <a:p>
             <a:r>
-              <a:rPr lang="en-US" smtClean="0"/>
+              <a:rPr lang="en-US"/>
               <a:t>Click to edit Master title style</a:t>
             </a:r>
-            <a:endParaRPr lang="en-US"/>
           </a:p>
         </p:txBody>
       </p:sp>
@@ -356,38 +358,37 @@
           <a:p>
             <a:pPr lvl="0"/>
             <a:r>
-              <a:rPr lang="en-US" smtClean="0"/>
+              <a:rPr lang="en-US"/>
               <a:t>Click to edit Master text styles</a:t>
             </a:r>
           </a:p>
           <a:p>
             <a:pPr lvl="1"/>
             <a:r>
-              <a:rPr lang="en-US" smtClean="0"/>
+              <a:rPr lang="en-US"/>
               <a:t>Second level</a:t>
             </a:r>
           </a:p>
           <a:p>
             <a:pPr lvl="2"/>
             <a:r>
-              <a:rPr lang="en-US" smtClean="0"/>
+              <a:rPr lang="en-US"/>
               <a:t>Third level</a:t>
             </a:r>
           </a:p>
           <a:p>
             <a:pPr lvl="3"/>
             <a:r>
-              <a:rPr lang="en-US" smtClean="0"/>
+              <a:rPr lang="en-US"/>
               <a:t>Fourth level</a:t>
             </a:r>
           </a:p>
           <a:p>
             <a:pPr lvl="4"/>
             <a:r>
-              <a:rPr lang="en-US" smtClean="0"/>
+              <a:rPr lang="en-US"/>
               <a:t>Fifth level</a:t>
             </a:r>
-            <a:endParaRPr lang="en-US"/>
           </a:p>
         </p:txBody>
       </p:sp>
@@ -408,7 +409,7 @@
           <a:p>
             <a:fld id="{BED1614E-28FD-C54C-811F-CB4EE2076F62}" type="datetimeFigureOut">
               <a:rPr lang="en-US" smtClean="0"/>
-              <a:t>1/27/17</a:t>
+              <a:t>9/5/2017</a:t>
             </a:fld>
             <a:endParaRPr lang="en-US"/>
           </a:p>
@@ -507,10 +508,9 @@
           <a:lstStyle/>
           <a:p>
             <a:r>
-              <a:rPr lang="en-US" smtClean="0"/>
+              <a:rPr lang="en-US"/>
               <a:t>Click to edit Master title style</a:t>
             </a:r>
-            <a:endParaRPr lang="en-US"/>
           </a:p>
         </p:txBody>
       </p:sp>
@@ -536,38 +536,37 @@
           <a:p>
             <a:pPr lvl="0"/>
             <a:r>
-              <a:rPr lang="en-US" smtClean="0"/>
+              <a:rPr lang="en-US"/>
               <a:t>Click to edit Master text styles</a:t>
             </a:r>
           </a:p>
           <a:p>
             <a:pPr lvl="1"/>
             <a:r>
-              <a:rPr lang="en-US" smtClean="0"/>
+              <a:rPr lang="en-US"/>
               <a:t>Second level</a:t>
             </a:r>
           </a:p>
           <a:p>
             <a:pPr lvl="2"/>
             <a:r>
-              <a:rPr lang="en-US" smtClean="0"/>
+              <a:rPr lang="en-US"/>
               <a:t>Third level</a:t>
             </a:r>
           </a:p>
           <a:p>
             <a:pPr lvl="3"/>
             <a:r>
-              <a:rPr lang="en-US" smtClean="0"/>
+              <a:rPr lang="en-US"/>
               <a:t>Fourth level</a:t>
             </a:r>
           </a:p>
           <a:p>
             <a:pPr lvl="4"/>
             <a:r>
-              <a:rPr lang="en-US" smtClean="0"/>
+              <a:rPr lang="en-US"/>
               <a:t>Fifth level</a:t>
             </a:r>
-            <a:endParaRPr lang="en-US"/>
           </a:p>
         </p:txBody>
       </p:sp>
@@ -588,7 +587,7 @@
           <a:p>
             <a:fld id="{BED1614E-28FD-C54C-811F-CB4EE2076F62}" type="datetimeFigureOut">
               <a:rPr lang="en-US" smtClean="0"/>
-              <a:t>1/27/17</a:t>
+              <a:t>9/5/2017</a:t>
             </a:fld>
             <a:endParaRPr lang="en-US"/>
           </a:p>
@@ -682,10 +681,9 @@
           <a:lstStyle/>
           <a:p>
             <a:r>
-              <a:rPr lang="en-US" smtClean="0"/>
+              <a:rPr lang="en-US"/>
               <a:t>Click to edit Master title style</a:t>
             </a:r>
-            <a:endParaRPr lang="en-US"/>
           </a:p>
         </p:txBody>
       </p:sp>
@@ -706,38 +704,37 @@
           <a:p>
             <a:pPr lvl="0"/>
             <a:r>
-              <a:rPr lang="en-US" smtClean="0"/>
+              <a:rPr lang="en-US"/>
               <a:t>Click to edit Master text styles</a:t>
             </a:r>
           </a:p>
           <a:p>
             <a:pPr lvl="1"/>
             <a:r>
-              <a:rPr lang="en-US" smtClean="0"/>
+              <a:rPr lang="en-US"/>
               <a:t>Second level</a:t>
             </a:r>
           </a:p>
           <a:p>
             <a:pPr lvl="2"/>
             <a:r>
-              <a:rPr lang="en-US" smtClean="0"/>
+              <a:rPr lang="en-US"/>
               <a:t>Third level</a:t>
             </a:r>
           </a:p>
           <a:p>
             <a:pPr lvl="3"/>
             <a:r>
-              <a:rPr lang="en-US" smtClean="0"/>
+              <a:rPr lang="en-US"/>
               <a:t>Fourth level</a:t>
             </a:r>
           </a:p>
           <a:p>
             <a:pPr lvl="4"/>
             <a:r>
-              <a:rPr lang="en-US" smtClean="0"/>
+              <a:rPr lang="en-US"/>
               <a:t>Fifth level</a:t>
             </a:r>
-            <a:endParaRPr lang="en-US"/>
           </a:p>
         </p:txBody>
       </p:sp>
@@ -758,7 +755,7 @@
           <a:p>
             <a:fld id="{BED1614E-28FD-C54C-811F-CB4EE2076F62}" type="datetimeFigureOut">
               <a:rPr lang="en-US" smtClean="0"/>
-              <a:t>1/27/17</a:t>
+              <a:t>9/5/2017</a:t>
             </a:fld>
             <a:endParaRPr lang="en-US"/>
           </a:p>
@@ -861,10 +858,9 @@
           </a:lstStyle>
           <a:p>
             <a:r>
-              <a:rPr lang="en-US" smtClean="0"/>
+              <a:rPr lang="en-US"/>
               <a:t>Click to edit Master title style</a:t>
             </a:r>
-            <a:endParaRPr lang="en-US"/>
           </a:p>
         </p:txBody>
       </p:sp>
@@ -981,7 +977,7 @@
           <a:p>
             <a:pPr lvl="0"/>
             <a:r>
-              <a:rPr lang="en-US" smtClean="0"/>
+              <a:rPr lang="en-US"/>
               <a:t>Click to edit Master text styles</a:t>
             </a:r>
           </a:p>
@@ -1004,7 +1000,7 @@
           <a:p>
             <a:fld id="{BED1614E-28FD-C54C-811F-CB4EE2076F62}" type="datetimeFigureOut">
               <a:rPr lang="en-US" smtClean="0"/>
-              <a:t>1/27/17</a:t>
+              <a:t>9/5/2017</a:t>
             </a:fld>
             <a:endParaRPr lang="en-US"/>
           </a:p>
@@ -1098,10 +1094,9 @@
           <a:lstStyle/>
           <a:p>
             <a:r>
-              <a:rPr lang="en-US" smtClean="0"/>
+              <a:rPr lang="en-US"/>
               <a:t>Click to edit Master title style</a:t>
             </a:r>
-            <a:endParaRPr lang="en-US"/>
           </a:p>
         </p:txBody>
       </p:sp>
@@ -1127,38 +1122,37 @@
           <a:p>
             <a:pPr lvl="0"/>
             <a:r>
-              <a:rPr lang="en-US" smtClean="0"/>
+              <a:rPr lang="en-US"/>
               <a:t>Click to edit Master text styles</a:t>
             </a:r>
           </a:p>
           <a:p>
             <a:pPr lvl="1"/>
             <a:r>
-              <a:rPr lang="en-US" smtClean="0"/>
+              <a:rPr lang="en-US"/>
               <a:t>Second level</a:t>
             </a:r>
           </a:p>
           <a:p>
             <a:pPr lvl="2"/>
             <a:r>
-              <a:rPr lang="en-US" smtClean="0"/>
+              <a:rPr lang="en-US"/>
               <a:t>Third level</a:t>
             </a:r>
           </a:p>
           <a:p>
             <a:pPr lvl="3"/>
             <a:r>
-              <a:rPr lang="en-US" smtClean="0"/>
+              <a:rPr lang="en-US"/>
               <a:t>Fourth level</a:t>
             </a:r>
           </a:p>
           <a:p>
             <a:pPr lvl="4"/>
             <a:r>
-              <a:rPr lang="en-US" smtClean="0"/>
+              <a:rPr lang="en-US"/>
               <a:t>Fifth level</a:t>
             </a:r>
-            <a:endParaRPr lang="en-US"/>
           </a:p>
         </p:txBody>
       </p:sp>
@@ -1184,38 +1178,37 @@
           <a:p>
             <a:pPr lvl="0"/>
             <a:r>
-              <a:rPr lang="en-US" smtClean="0"/>
+              <a:rPr lang="en-US"/>
               <a:t>Click to edit Master text styles</a:t>
             </a:r>
           </a:p>
           <a:p>
             <a:pPr lvl="1"/>
             <a:r>
-              <a:rPr lang="en-US" smtClean="0"/>
+              <a:rPr lang="en-US"/>
               <a:t>Second level</a:t>
             </a:r>
           </a:p>
           <a:p>
             <a:pPr lvl="2"/>
             <a:r>
-              <a:rPr lang="en-US" smtClean="0"/>
+              <a:rPr lang="en-US"/>
               <a:t>Third level</a:t>
             </a:r>
           </a:p>
           <a:p>
             <a:pPr lvl="3"/>
             <a:r>
-              <a:rPr lang="en-US" smtClean="0"/>
+              <a:rPr lang="en-US"/>
               <a:t>Fourth level</a:t>
             </a:r>
           </a:p>
           <a:p>
             <a:pPr lvl="4"/>
             <a:r>
-              <a:rPr lang="en-US" smtClean="0"/>
+              <a:rPr lang="en-US"/>
               <a:t>Fifth level</a:t>
             </a:r>
-            <a:endParaRPr lang="en-US"/>
           </a:p>
         </p:txBody>
       </p:sp>
@@ -1236,7 +1229,7 @@
           <a:p>
             <a:fld id="{BED1614E-28FD-C54C-811F-CB4EE2076F62}" type="datetimeFigureOut">
               <a:rPr lang="en-US" smtClean="0"/>
-              <a:t>1/27/17</a:t>
+              <a:t>9/5/2017</a:t>
             </a:fld>
             <a:endParaRPr lang="en-US"/>
           </a:p>
@@ -1335,10 +1328,9 @@
           <a:lstStyle/>
           <a:p>
             <a:r>
-              <a:rPr lang="en-US" smtClean="0"/>
+              <a:rPr lang="en-US"/>
               <a:t>Click to edit Master title style</a:t>
             </a:r>
-            <a:endParaRPr lang="en-US"/>
           </a:p>
         </p:txBody>
       </p:sp>
@@ -1401,7 +1393,7 @@
           <a:p>
             <a:pPr lvl="0"/>
             <a:r>
-              <a:rPr lang="en-US" smtClean="0"/>
+              <a:rPr lang="en-US"/>
               <a:t>Click to edit Master text styles</a:t>
             </a:r>
           </a:p>
@@ -1429,38 +1421,37 @@
           <a:p>
             <a:pPr lvl="0"/>
             <a:r>
-              <a:rPr lang="en-US" smtClean="0"/>
+              <a:rPr lang="en-US"/>
               <a:t>Click to edit Master text styles</a:t>
             </a:r>
           </a:p>
           <a:p>
             <a:pPr lvl="1"/>
             <a:r>
-              <a:rPr lang="en-US" smtClean="0"/>
+              <a:rPr lang="en-US"/>
               <a:t>Second level</a:t>
             </a:r>
           </a:p>
           <a:p>
             <a:pPr lvl="2"/>
             <a:r>
-              <a:rPr lang="en-US" smtClean="0"/>
+              <a:rPr lang="en-US"/>
               <a:t>Third level</a:t>
             </a:r>
           </a:p>
           <a:p>
             <a:pPr lvl="3"/>
             <a:r>
-              <a:rPr lang="en-US" smtClean="0"/>
+              <a:rPr lang="en-US"/>
               <a:t>Fourth level</a:t>
             </a:r>
           </a:p>
           <a:p>
             <a:pPr lvl="4"/>
             <a:r>
-              <a:rPr lang="en-US" smtClean="0"/>
+              <a:rPr lang="en-US"/>
               <a:t>Fifth level</a:t>
             </a:r>
-            <a:endParaRPr lang="en-US"/>
           </a:p>
         </p:txBody>
       </p:sp>
@@ -1523,7 +1514,7 @@
           <a:p>
             <a:pPr lvl="0"/>
             <a:r>
-              <a:rPr lang="en-US" smtClean="0"/>
+              <a:rPr lang="en-US"/>
               <a:t>Click to edit Master text styles</a:t>
             </a:r>
           </a:p>
@@ -1551,38 +1542,37 @@
           <a:p>
             <a:pPr lvl="0"/>
             <a:r>
-              <a:rPr lang="en-US" smtClean="0"/>
+              <a:rPr lang="en-US"/>
               <a:t>Click to edit Master text styles</a:t>
             </a:r>
           </a:p>
           <a:p>
             <a:pPr lvl="1"/>
             <a:r>
-              <a:rPr lang="en-US" smtClean="0"/>
+              <a:rPr lang="en-US"/>
               <a:t>Second level</a:t>
             </a:r>
           </a:p>
           <a:p>
             <a:pPr lvl="2"/>
             <a:r>
-              <a:rPr lang="en-US" smtClean="0"/>
+              <a:rPr lang="en-US"/>
               <a:t>Third level</a:t>
             </a:r>
           </a:p>
           <a:p>
             <a:pPr lvl="3"/>
             <a:r>
-              <a:rPr lang="en-US" smtClean="0"/>
+              <a:rPr lang="en-US"/>
               <a:t>Fourth level</a:t>
             </a:r>
           </a:p>
           <a:p>
             <a:pPr lvl="4"/>
             <a:r>
-              <a:rPr lang="en-US" smtClean="0"/>
+              <a:rPr lang="en-US"/>
               <a:t>Fifth level</a:t>
             </a:r>
-            <a:endParaRPr lang="en-US"/>
           </a:p>
         </p:txBody>
       </p:sp>
@@ -1603,7 +1593,7 @@
           <a:p>
             <a:fld id="{BED1614E-28FD-C54C-811F-CB4EE2076F62}" type="datetimeFigureOut">
               <a:rPr lang="en-US" smtClean="0"/>
-              <a:t>1/27/17</a:t>
+              <a:t>9/5/2017</a:t>
             </a:fld>
             <a:endParaRPr lang="en-US"/>
           </a:p>
@@ -1697,10 +1687,9 @@
           <a:lstStyle/>
           <a:p>
             <a:r>
-              <a:rPr lang="en-US" smtClean="0"/>
+              <a:rPr lang="en-US"/>
               <a:t>Click to edit Master title style</a:t>
             </a:r>
-            <a:endParaRPr lang="en-US"/>
           </a:p>
         </p:txBody>
       </p:sp>
@@ -1721,7 +1710,7 @@
           <a:p>
             <a:fld id="{BED1614E-28FD-C54C-811F-CB4EE2076F62}" type="datetimeFigureOut">
               <a:rPr lang="en-US" smtClean="0"/>
-              <a:t>1/27/17</a:t>
+              <a:t>9/5/2017</a:t>
             </a:fld>
             <a:endParaRPr lang="en-US"/>
           </a:p>
@@ -1816,7 +1805,7 @@
           <a:p>
             <a:fld id="{BED1614E-28FD-C54C-811F-CB4EE2076F62}" type="datetimeFigureOut">
               <a:rPr lang="en-US" smtClean="0"/>
-              <a:t>1/27/17</a:t>
+              <a:t>9/5/2017</a:t>
             </a:fld>
             <a:endParaRPr lang="en-US"/>
           </a:p>
@@ -1919,10 +1908,9 @@
           </a:lstStyle>
           <a:p>
             <a:r>
-              <a:rPr lang="en-US" smtClean="0"/>
+              <a:rPr lang="en-US"/>
               <a:t>Click to edit Master title style</a:t>
             </a:r>
-            <a:endParaRPr lang="en-US"/>
           </a:p>
         </p:txBody>
       </p:sp>
@@ -1976,38 +1964,37 @@
           <a:p>
             <a:pPr lvl="0"/>
             <a:r>
-              <a:rPr lang="en-US" smtClean="0"/>
+              <a:rPr lang="en-US"/>
               <a:t>Click to edit Master text styles</a:t>
             </a:r>
           </a:p>
           <a:p>
             <a:pPr lvl="1"/>
             <a:r>
-              <a:rPr lang="en-US" smtClean="0"/>
+              <a:rPr lang="en-US"/>
               <a:t>Second level</a:t>
             </a:r>
           </a:p>
           <a:p>
             <a:pPr lvl="2"/>
             <a:r>
-              <a:rPr lang="en-US" smtClean="0"/>
+              <a:rPr lang="en-US"/>
               <a:t>Third level</a:t>
             </a:r>
           </a:p>
           <a:p>
             <a:pPr lvl="3"/>
             <a:r>
-              <a:rPr lang="en-US" smtClean="0"/>
+              <a:rPr lang="en-US"/>
               <a:t>Fourth level</a:t>
             </a:r>
           </a:p>
           <a:p>
             <a:pPr lvl="4"/>
             <a:r>
-              <a:rPr lang="en-US" smtClean="0"/>
+              <a:rPr lang="en-US"/>
               <a:t>Fifth level</a:t>
             </a:r>
-            <a:endParaRPr lang="en-US"/>
           </a:p>
         </p:txBody>
       </p:sp>
@@ -2070,7 +2057,7 @@
           <a:p>
             <a:pPr lvl="0"/>
             <a:r>
-              <a:rPr lang="en-US" smtClean="0"/>
+              <a:rPr lang="en-US"/>
               <a:t>Click to edit Master text styles</a:t>
             </a:r>
           </a:p>
@@ -2093,7 +2080,7 @@
           <a:p>
             <a:fld id="{BED1614E-28FD-C54C-811F-CB4EE2076F62}" type="datetimeFigureOut">
               <a:rPr lang="en-US" smtClean="0"/>
-              <a:t>1/27/17</a:t>
+              <a:t>9/5/2017</a:t>
             </a:fld>
             <a:endParaRPr lang="en-US"/>
           </a:p>
@@ -2196,10 +2183,9 @@
           </a:lstStyle>
           <a:p>
             <a:r>
-              <a:rPr lang="en-US" smtClean="0"/>
+              <a:rPr lang="en-US"/>
               <a:t>Click to edit Master title style</a:t>
             </a:r>
-            <a:endParaRPr lang="en-US"/>
           </a:p>
         </p:txBody>
       </p:sp>
@@ -2323,7 +2309,7 @@
           <a:p>
             <a:pPr lvl="0"/>
             <a:r>
-              <a:rPr lang="en-US" smtClean="0"/>
+              <a:rPr lang="en-US"/>
               <a:t>Click to edit Master text styles</a:t>
             </a:r>
           </a:p>
@@ -2346,7 +2332,7 @@
           <a:p>
             <a:fld id="{BED1614E-28FD-C54C-811F-CB4EE2076F62}" type="datetimeFigureOut">
               <a:rPr lang="en-US" smtClean="0"/>
-              <a:t>1/27/17</a:t>
+              <a:t>9/5/2017</a:t>
             </a:fld>
             <a:endParaRPr lang="en-US"/>
           </a:p>
@@ -2455,10 +2441,9 @@
           <a:lstStyle/>
           <a:p>
             <a:r>
-              <a:rPr lang="en-US" smtClean="0"/>
+              <a:rPr lang="en-US"/>
               <a:t>Click to edit Master title style</a:t>
             </a:r>
-            <a:endParaRPr lang="en-US"/>
           </a:p>
         </p:txBody>
       </p:sp>
@@ -2489,38 +2474,37 @@
           <a:p>
             <a:pPr lvl="0"/>
             <a:r>
-              <a:rPr lang="en-US" smtClean="0"/>
+              <a:rPr lang="en-US"/>
               <a:t>Click to edit Master text styles</a:t>
             </a:r>
           </a:p>
           <a:p>
             <a:pPr lvl="1"/>
             <a:r>
-              <a:rPr lang="en-US" smtClean="0"/>
+              <a:rPr lang="en-US"/>
               <a:t>Second level</a:t>
             </a:r>
           </a:p>
           <a:p>
             <a:pPr lvl="2"/>
             <a:r>
-              <a:rPr lang="en-US" smtClean="0"/>
+              <a:rPr lang="en-US"/>
               <a:t>Third level</a:t>
             </a:r>
           </a:p>
           <a:p>
             <a:pPr lvl="3"/>
             <a:r>
-              <a:rPr lang="en-US" smtClean="0"/>
+              <a:rPr lang="en-US"/>
               <a:t>Fourth level</a:t>
             </a:r>
           </a:p>
           <a:p>
             <a:pPr lvl="4"/>
             <a:r>
-              <a:rPr lang="en-US" smtClean="0"/>
+              <a:rPr lang="en-US"/>
               <a:t>Fifth level</a:t>
             </a:r>
-            <a:endParaRPr lang="en-US"/>
           </a:p>
         </p:txBody>
       </p:sp>
@@ -2559,7 +2543,7 @@
           <a:p>
             <a:fld id="{BED1614E-28FD-C54C-811F-CB4EE2076F62}" type="datetimeFigureOut">
               <a:rPr lang="en-US" smtClean="0"/>
-              <a:t>1/27/17</a:t>
+              <a:t>9/5/2017</a:t>
             </a:fld>
             <a:endParaRPr lang="en-US"/>
           </a:p>
@@ -3043,7 +3027,7 @@
           </a:ln>
           <a:extLst>
             <a:ext uri="{FAA26D3D-D897-4be2-8F04-BA451C77F1D7}">
-              <ma14:placeholderFlag xmlns:ma14="http://schemas.microsoft.com/office/mac/drawingml/2011/main"/>
+              <ma14:placeholderFlag xmlns:ma14="http://schemas.microsoft.com/office/mac/drawingml/2011/main" xmlns=""/>
             </a:ext>
           </a:extLst>
         </p:spPr>
@@ -3075,7 +3059,7 @@
           <a:p>
             <a:pPr algn="r"/>
             <a:r>
-              <a:rPr lang="en-US" i="1" dirty="0" smtClean="0">
+              <a:rPr lang="en-US" i="1" dirty="0">
                 <a:solidFill>
                   <a:schemeClr val="bg1"/>
                 </a:solidFill>
@@ -3089,7 +3073,7 @@
           <a:p>
             <a:pPr algn="r"/>
             <a:r>
-              <a:rPr lang="en-US" i="1" dirty="0" smtClean="0">
+              <a:rPr lang="en-US" i="1" dirty="0">
                 <a:solidFill>
                   <a:schemeClr val="bg1"/>
                 </a:solidFill>
@@ -3099,14 +3083,6 @@
               </a:rPr>
               <a:t>Solution Engineering Team</a:t>
             </a:r>
-            <a:endParaRPr lang="en-US" i="1" dirty="0">
-              <a:solidFill>
-                <a:schemeClr val="bg1"/>
-              </a:solidFill>
-              <a:latin typeface="Tahoma" charset="0"/>
-              <a:ea typeface="Tahoma" charset="0"/>
-              <a:cs typeface="Tahoma" charset="0"/>
-            </a:endParaRPr>
           </a:p>
         </p:txBody>
       </p:sp>
@@ -3137,7 +3113,7 @@
           <a:p>
             <a:pPr algn="r"/>
             <a:r>
-              <a:rPr lang="en-US" sz="2800" b="1" dirty="0" smtClean="0">
+              <a:rPr lang="en-US" sz="2800" b="1" dirty="0">
                 <a:solidFill>
                   <a:schemeClr val="bg1"/>
                 </a:solidFill>
@@ -3145,13 +3121,13 @@
                 <a:ea typeface="Tahoma" charset="0"/>
                 <a:cs typeface="Tahoma" charset="0"/>
               </a:rPr>
-              <a:t>100</a:t>
+              <a:t>200</a:t>
             </a:r>
           </a:p>
           <a:p>
             <a:pPr algn="r"/>
             <a:r>
-              <a:rPr lang="en-US" sz="2000" b="1" dirty="0" smtClean="0">
+              <a:rPr lang="en-US" sz="2000" b="1" dirty="0">
                 <a:solidFill>
                   <a:schemeClr val="bg1"/>
                 </a:solidFill>
@@ -3165,7 +3141,7 @@
           <a:p>
             <a:pPr algn="r"/>
             <a:r>
-              <a:rPr lang="en-US" sz="2000" b="1" dirty="0" smtClean="0">
+              <a:rPr lang="en-US" sz="2000" b="1" dirty="0">
                 <a:solidFill>
                   <a:schemeClr val="bg1"/>
                 </a:solidFill>
@@ -3175,14 +3151,6 @@
               </a:rPr>
               <a:t>Cloud Workshop</a:t>
             </a:r>
-            <a:endParaRPr lang="en-US" sz="2000" b="1" dirty="0">
-              <a:solidFill>
-                <a:schemeClr val="bg1"/>
-              </a:solidFill>
-              <a:latin typeface="Tahoma" charset="0"/>
-              <a:ea typeface="Tahoma" charset="0"/>
-              <a:cs typeface="Tahoma" charset="0"/>
-            </a:endParaRPr>
           </a:p>
         </p:txBody>
       </p:sp>
@@ -3194,8 +3162,8 @@
         </p:nvSpPr>
         <p:spPr>
           <a:xfrm>
-            <a:off x="5702740" y="3994726"/>
-            <a:ext cx="3001143" cy="646331"/>
+            <a:off x="4840325" y="3994726"/>
+            <a:ext cx="3863558" cy="646331"/>
           </a:xfrm>
           <a:prstGeom prst="rect">
             <a:avLst/>
@@ -3213,7 +3181,7 @@
           <a:p>
             <a:pPr algn="r"/>
             <a:r>
-              <a:rPr lang="en-US" b="1" dirty="0" smtClean="0">
+              <a:rPr lang="en-US" b="1" dirty="0">
                 <a:solidFill>
                   <a:schemeClr val="bg1"/>
                 </a:solidFill>
@@ -3227,7 +3195,7 @@
           <a:p>
             <a:pPr algn="r"/>
             <a:r>
-              <a:rPr lang="en-US" b="1" dirty="0" err="1" smtClean="0">
+              <a:rPr lang="en-US" b="1" dirty="0">
                 <a:solidFill>
                   <a:schemeClr val="bg1"/>
                 </a:solidFill>
@@ -3235,27 +3203,8 @@
                 <a:ea typeface="Tahoma" charset="0"/>
                 <a:cs typeface="Tahoma" charset="0"/>
               </a:rPr>
-              <a:t>Microservices</a:t>
-            </a:r>
-            <a:r>
-              <a:rPr lang="en-US" b="1" dirty="0" smtClean="0">
-                <a:solidFill>
-                  <a:schemeClr val="bg1"/>
-                </a:solidFill>
-                <a:latin typeface="Tahoma" charset="0"/>
-                <a:ea typeface="Tahoma" charset="0"/>
-                <a:cs typeface="Tahoma" charset="0"/>
-              </a:rPr>
-              <a:t> Workshop</a:t>
-            </a:r>
-            <a:endParaRPr lang="en-US" b="1" dirty="0">
-              <a:solidFill>
-                <a:schemeClr val="bg1"/>
-              </a:solidFill>
-              <a:latin typeface="Tahoma" charset="0"/>
-              <a:ea typeface="Tahoma" charset="0"/>
-              <a:cs typeface="Tahoma" charset="0"/>
-            </a:endParaRPr>
+              <a:t>Microservices MySQL Workshop</a:t>
+            </a:r>
           </a:p>
         </p:txBody>
       </p:sp>

</xml_diff>

<commit_message>
Updates to lab 400
</commit_message>
<xml_diff>
--- a/workshops/microservices-MySQL/WorkshopHeader.pptx
+++ b/workshops/microservices-MySQL/WorkshopHeader.pptx
@@ -6,6 +6,8 @@
   </p:sldMasterIdLst>
   <p:sldIdLst>
     <p:sldId id="257" r:id="rId2"/>
+    <p:sldId id="258" r:id="rId3"/>
+    <p:sldId id="259" r:id="rId4"/>
   </p:sldIdLst>
   <p:sldSz cx="12192000" cy="6858000"/>
   <p:notesSz cx="6858000" cy="9144000"/>
@@ -241,7 +243,7 @@
           <a:p>
             <a:fld id="{BED1614E-28FD-C54C-811F-CB4EE2076F62}" type="datetimeFigureOut">
               <a:rPr lang="en-US" smtClean="0"/>
-              <a:t>9/5/2017</a:t>
+              <a:t>9/22/2017</a:t>
             </a:fld>
             <a:endParaRPr lang="en-US"/>
           </a:p>
@@ -409,7 +411,7 @@
           <a:p>
             <a:fld id="{BED1614E-28FD-C54C-811F-CB4EE2076F62}" type="datetimeFigureOut">
               <a:rPr lang="en-US" smtClean="0"/>
-              <a:t>9/5/2017</a:t>
+              <a:t>9/22/2017</a:t>
             </a:fld>
             <a:endParaRPr lang="en-US"/>
           </a:p>
@@ -587,7 +589,7 @@
           <a:p>
             <a:fld id="{BED1614E-28FD-C54C-811F-CB4EE2076F62}" type="datetimeFigureOut">
               <a:rPr lang="en-US" smtClean="0"/>
-              <a:t>9/5/2017</a:t>
+              <a:t>9/22/2017</a:t>
             </a:fld>
             <a:endParaRPr lang="en-US"/>
           </a:p>
@@ -755,7 +757,7 @@
           <a:p>
             <a:fld id="{BED1614E-28FD-C54C-811F-CB4EE2076F62}" type="datetimeFigureOut">
               <a:rPr lang="en-US" smtClean="0"/>
-              <a:t>9/5/2017</a:t>
+              <a:t>9/22/2017</a:t>
             </a:fld>
             <a:endParaRPr lang="en-US"/>
           </a:p>
@@ -1000,7 +1002,7 @@
           <a:p>
             <a:fld id="{BED1614E-28FD-C54C-811F-CB4EE2076F62}" type="datetimeFigureOut">
               <a:rPr lang="en-US" smtClean="0"/>
-              <a:t>9/5/2017</a:t>
+              <a:t>9/22/2017</a:t>
             </a:fld>
             <a:endParaRPr lang="en-US"/>
           </a:p>
@@ -1229,7 +1231,7 @@
           <a:p>
             <a:fld id="{BED1614E-28FD-C54C-811F-CB4EE2076F62}" type="datetimeFigureOut">
               <a:rPr lang="en-US" smtClean="0"/>
-              <a:t>9/5/2017</a:t>
+              <a:t>9/22/2017</a:t>
             </a:fld>
             <a:endParaRPr lang="en-US"/>
           </a:p>
@@ -1593,7 +1595,7 @@
           <a:p>
             <a:fld id="{BED1614E-28FD-C54C-811F-CB4EE2076F62}" type="datetimeFigureOut">
               <a:rPr lang="en-US" smtClean="0"/>
-              <a:t>9/5/2017</a:t>
+              <a:t>9/22/2017</a:t>
             </a:fld>
             <a:endParaRPr lang="en-US"/>
           </a:p>
@@ -1710,7 +1712,7 @@
           <a:p>
             <a:fld id="{BED1614E-28FD-C54C-811F-CB4EE2076F62}" type="datetimeFigureOut">
               <a:rPr lang="en-US" smtClean="0"/>
-              <a:t>9/5/2017</a:t>
+              <a:t>9/22/2017</a:t>
             </a:fld>
             <a:endParaRPr lang="en-US"/>
           </a:p>
@@ -1805,7 +1807,7 @@
           <a:p>
             <a:fld id="{BED1614E-28FD-C54C-811F-CB4EE2076F62}" type="datetimeFigureOut">
               <a:rPr lang="en-US" smtClean="0"/>
-              <a:t>9/5/2017</a:t>
+              <a:t>9/22/2017</a:t>
             </a:fld>
             <a:endParaRPr lang="en-US"/>
           </a:p>
@@ -2080,7 +2082,7 @@
           <a:p>
             <a:fld id="{BED1614E-28FD-C54C-811F-CB4EE2076F62}" type="datetimeFigureOut">
               <a:rPr lang="en-US" smtClean="0"/>
-              <a:t>9/5/2017</a:t>
+              <a:t>9/22/2017</a:t>
             </a:fld>
             <a:endParaRPr lang="en-US"/>
           </a:p>
@@ -2332,7 +2334,7 @@
           <a:p>
             <a:fld id="{BED1614E-28FD-C54C-811F-CB4EE2076F62}" type="datetimeFigureOut">
               <a:rPr lang="en-US" smtClean="0"/>
-              <a:t>9/5/2017</a:t>
+              <a:t>9/22/2017</a:t>
             </a:fld>
             <a:endParaRPr lang="en-US"/>
           </a:p>
@@ -2543,7 +2545,7 @@
           <a:p>
             <a:fld id="{BED1614E-28FD-C54C-811F-CB4EE2076F62}" type="datetimeFigureOut">
               <a:rPr lang="en-US" smtClean="0"/>
-              <a:t>9/5/2017</a:t>
+              <a:t>9/22/2017</a:t>
             </a:fld>
             <a:endParaRPr lang="en-US"/>
           </a:p>
@@ -3027,7 +3029,7 @@
           </a:ln>
           <a:extLst>
             <a:ext uri="{FAA26D3D-D897-4be2-8F04-BA451C77F1D7}">
-              <ma14:placeholderFlag xmlns:ma14="http://schemas.microsoft.com/office/mac/drawingml/2011/main" xmlns=""/>
+              <ma14:placeholderFlag xmlns="" xmlns:ma14="http://schemas.microsoft.com/office/mac/drawingml/2011/main"/>
             </a:ext>
           </a:extLst>
         </p:spPr>
@@ -3212,6 +3214,274 @@
     <p:extLst>
       <p:ext uri="{BB962C8B-B14F-4D97-AF65-F5344CB8AC3E}">
         <p14:creationId xmlns:p14="http://schemas.microsoft.com/office/powerpoint/2010/main" val="68740902"/>
+      </p:ext>
+    </p:extLst>
+  </p:cSld>
+  <p:clrMapOvr>
+    <a:masterClrMapping/>
+  </p:clrMapOvr>
+</p:sld>
+</file>
+
+<file path=ppt/slides/slide2.xml><?xml version="1.0" encoding="utf-8"?>
+<p:sld xmlns:a="http://schemas.openxmlformats.org/drawingml/2006/main" xmlns:r="http://schemas.openxmlformats.org/officeDocument/2006/relationships" xmlns:p="http://schemas.openxmlformats.org/presentationml/2006/main">
+  <p:cSld>
+    <p:spTree>
+      <p:nvGrpSpPr>
+        <p:cNvPr id="1" name=""/>
+        <p:cNvGrpSpPr/>
+        <p:nvPr/>
+      </p:nvGrpSpPr>
+      <p:grpSpPr>
+        <a:xfrm>
+          <a:off x="0" y="0"/>
+          <a:ext cx="0" cy="0"/>
+          <a:chOff x="0" y="0"/>
+          <a:chExt cx="0" cy="0"/>
+        </a:xfrm>
+      </p:grpSpPr>
+      <p:pic>
+        <p:nvPicPr>
+          <p:cNvPr id="4" name="Picture 3"/>
+          <p:cNvPicPr>
+            <a:picLocks noChangeAspect="1"/>
+          </p:cNvPicPr>
+          <p:nvPr/>
+        </p:nvPicPr>
+        <p:blipFill>
+          <a:blip r:embed="rId2"/>
+          <a:stretch>
+            <a:fillRect/>
+          </a:stretch>
+        </p:blipFill>
+        <p:spPr>
+          <a:xfrm>
+            <a:off x="87109" y="1078026"/>
+            <a:ext cx="12017781" cy="4701947"/>
+          </a:xfrm>
+          <a:prstGeom prst="rect">
+            <a:avLst/>
+          </a:prstGeom>
+        </p:spPr>
+      </p:pic>
+      <p:sp>
+        <p:nvSpPr>
+          <p:cNvPr id="5" name="Oval 4"/>
+          <p:cNvSpPr/>
+          <p:nvPr/>
+        </p:nvSpPr>
+        <p:spPr>
+          <a:xfrm>
+            <a:off x="87109" y="1160768"/>
+            <a:ext cx="1089966" cy="335902"/>
+          </a:xfrm>
+          <a:prstGeom prst="ellipse">
+            <a:avLst/>
+          </a:prstGeom>
+          <a:noFill/>
+          <a:ln w="38100">
+            <a:solidFill>
+              <a:srgbClr val="C00000"/>
+            </a:solidFill>
+          </a:ln>
+        </p:spPr>
+        <p:style>
+          <a:lnRef idx="2">
+            <a:schemeClr val="accent1">
+              <a:shade val="50000"/>
+            </a:schemeClr>
+          </a:lnRef>
+          <a:fillRef idx="1">
+            <a:schemeClr val="accent1"/>
+          </a:fillRef>
+          <a:effectRef idx="0">
+            <a:schemeClr val="accent1"/>
+          </a:effectRef>
+          <a:fontRef idx="minor">
+            <a:schemeClr val="lt1"/>
+          </a:fontRef>
+        </p:style>
+        <p:txBody>
+          <a:bodyPr rtlCol="0" anchor="ctr"/>
+          <a:lstStyle/>
+          <a:p>
+            <a:pPr algn="ctr"/>
+            <a:endParaRPr lang="en-US"/>
+          </a:p>
+        </p:txBody>
+      </p:sp>
+      <p:sp>
+        <p:nvSpPr>
+          <p:cNvPr id="6" name="Oval 5"/>
+          <p:cNvSpPr/>
+          <p:nvPr/>
+        </p:nvSpPr>
+        <p:spPr>
+          <a:xfrm>
+            <a:off x="8021635" y="3890998"/>
+            <a:ext cx="2172951" cy="335902"/>
+          </a:xfrm>
+          <a:prstGeom prst="ellipse">
+            <a:avLst/>
+          </a:prstGeom>
+          <a:noFill/>
+          <a:ln w="38100">
+            <a:solidFill>
+              <a:srgbClr val="C00000"/>
+            </a:solidFill>
+          </a:ln>
+        </p:spPr>
+        <p:style>
+          <a:lnRef idx="2">
+            <a:schemeClr val="accent1">
+              <a:shade val="50000"/>
+            </a:schemeClr>
+          </a:lnRef>
+          <a:fillRef idx="1">
+            <a:schemeClr val="accent1"/>
+          </a:fillRef>
+          <a:effectRef idx="0">
+            <a:schemeClr val="accent1"/>
+          </a:effectRef>
+          <a:fontRef idx="minor">
+            <a:schemeClr val="lt1"/>
+          </a:fontRef>
+        </p:style>
+        <p:txBody>
+          <a:bodyPr rtlCol="0" anchor="ctr"/>
+          <a:lstStyle/>
+          <a:p>
+            <a:pPr algn="ctr"/>
+            <a:endParaRPr lang="en-US"/>
+          </a:p>
+        </p:txBody>
+      </p:sp>
+      <p:sp>
+        <p:nvSpPr>
+          <p:cNvPr id="7" name="Oval 6"/>
+          <p:cNvSpPr/>
+          <p:nvPr/>
+        </p:nvSpPr>
+        <p:spPr>
+          <a:xfrm>
+            <a:off x="8021634" y="4390881"/>
+            <a:ext cx="752715" cy="335902"/>
+          </a:xfrm>
+          <a:prstGeom prst="ellipse">
+            <a:avLst/>
+          </a:prstGeom>
+          <a:noFill/>
+          <a:ln w="38100">
+            <a:solidFill>
+              <a:srgbClr val="C00000"/>
+            </a:solidFill>
+          </a:ln>
+        </p:spPr>
+        <p:style>
+          <a:lnRef idx="2">
+            <a:schemeClr val="accent1">
+              <a:shade val="50000"/>
+            </a:schemeClr>
+          </a:lnRef>
+          <a:fillRef idx="1">
+            <a:schemeClr val="accent1"/>
+          </a:fillRef>
+          <a:effectRef idx="0">
+            <a:schemeClr val="accent1"/>
+          </a:effectRef>
+          <a:fontRef idx="minor">
+            <a:schemeClr val="lt1"/>
+          </a:fontRef>
+        </p:style>
+        <p:txBody>
+          <a:bodyPr rtlCol="0" anchor="ctr"/>
+          <a:lstStyle/>
+          <a:p>
+            <a:pPr algn="ctr"/>
+            <a:endParaRPr lang="en-US"/>
+          </a:p>
+        </p:txBody>
+      </p:sp>
+    </p:spTree>
+    <p:extLst>
+      <p:ext uri="{BB962C8B-B14F-4D97-AF65-F5344CB8AC3E}">
+        <p14:creationId xmlns:p14="http://schemas.microsoft.com/office/powerpoint/2010/main" val="3790207612"/>
+      </p:ext>
+    </p:extLst>
+  </p:cSld>
+  <p:clrMapOvr>
+    <a:masterClrMapping/>
+  </p:clrMapOvr>
+</p:sld>
+</file>
+
+<file path=ppt/slides/slide3.xml><?xml version="1.0" encoding="utf-8"?>
+<p:sld xmlns:a="http://schemas.openxmlformats.org/drawingml/2006/main" xmlns:r="http://schemas.openxmlformats.org/officeDocument/2006/relationships" xmlns:p="http://schemas.openxmlformats.org/presentationml/2006/main">
+  <p:cSld>
+    <p:spTree>
+      <p:nvGrpSpPr>
+        <p:cNvPr id="1" name=""/>
+        <p:cNvGrpSpPr/>
+        <p:nvPr/>
+      </p:nvGrpSpPr>
+      <p:grpSpPr>
+        <a:xfrm>
+          <a:off x="0" y="0"/>
+          <a:ext cx="0" cy="0"/>
+          <a:chOff x="0" y="0"/>
+          <a:chExt cx="0" cy="0"/>
+        </a:xfrm>
+      </p:grpSpPr>
+      <p:sp>
+        <p:nvSpPr>
+          <p:cNvPr id="2" name="Oval 1"/>
+          <p:cNvSpPr/>
+          <p:nvPr/>
+        </p:nvSpPr>
+        <p:spPr>
+          <a:xfrm>
+            <a:off x="2567634" y="3125755"/>
+            <a:ext cx="1089966" cy="335902"/>
+          </a:xfrm>
+          <a:prstGeom prst="ellipse">
+            <a:avLst/>
+          </a:prstGeom>
+          <a:noFill/>
+          <a:ln w="38100">
+            <a:solidFill>
+              <a:srgbClr val="C00000"/>
+            </a:solidFill>
+          </a:ln>
+        </p:spPr>
+        <p:style>
+          <a:lnRef idx="2">
+            <a:schemeClr val="accent1">
+              <a:shade val="50000"/>
+            </a:schemeClr>
+          </a:lnRef>
+          <a:fillRef idx="1">
+            <a:schemeClr val="accent1"/>
+          </a:fillRef>
+          <a:effectRef idx="0">
+            <a:schemeClr val="accent1"/>
+          </a:effectRef>
+          <a:fontRef idx="minor">
+            <a:schemeClr val="lt1"/>
+          </a:fontRef>
+        </p:style>
+        <p:txBody>
+          <a:bodyPr rtlCol="0" anchor="ctr"/>
+          <a:lstStyle/>
+          <a:p>
+            <a:pPr algn="ctr"/>
+            <a:endParaRPr lang="en-US"/>
+          </a:p>
+        </p:txBody>
+      </p:sp>
+    </p:spTree>
+    <p:extLst>
+      <p:ext uri="{BB962C8B-B14F-4D97-AF65-F5344CB8AC3E}">
+        <p14:creationId xmlns:p14="http://schemas.microsoft.com/office/powerpoint/2010/main" val="1383024459"/>
       </p:ext>
     </p:extLst>
   </p:cSld>

</xml_diff>